<commit_message>
last change april 19
Signed-off-by: VictorRodriguez <vm.rod25@gmail.com>
</commit_message>
<xml_diff>
--- a/images/IoT diagram.pptx
+++ b/images/IoT diagram.pptx
@@ -288,7 +288,7 @@
           <a:p>
             <a:fld id="{18F81777-8F04-A44C-ABED-7D64A68B4B66}" type="datetimeFigureOut">
               <a:rPr lang="en-US" smtClean="0"/>
-              <a:t>10/24/15</a:t>
+              <a:t>4/4/16</a:t>
             </a:fld>
             <a:endParaRPr lang="en-US"/>
           </a:p>
@@ -458,7 +458,7 @@
           <a:p>
             <a:fld id="{18F81777-8F04-A44C-ABED-7D64A68B4B66}" type="datetimeFigureOut">
               <a:rPr lang="en-US" smtClean="0"/>
-              <a:t>10/24/15</a:t>
+              <a:t>4/4/16</a:t>
             </a:fld>
             <a:endParaRPr lang="en-US"/>
           </a:p>
@@ -638,7 +638,7 @@
           <a:p>
             <a:fld id="{18F81777-8F04-A44C-ABED-7D64A68B4B66}" type="datetimeFigureOut">
               <a:rPr lang="en-US" smtClean="0"/>
-              <a:t>10/24/15</a:t>
+              <a:t>4/4/16</a:t>
             </a:fld>
             <a:endParaRPr lang="en-US"/>
           </a:p>
@@ -808,7 +808,7 @@
           <a:p>
             <a:fld id="{18F81777-8F04-A44C-ABED-7D64A68B4B66}" type="datetimeFigureOut">
               <a:rPr lang="en-US" smtClean="0"/>
-              <a:t>10/24/15</a:t>
+              <a:t>4/4/16</a:t>
             </a:fld>
             <a:endParaRPr lang="en-US"/>
           </a:p>
@@ -1054,7 +1054,7 @@
           <a:p>
             <a:fld id="{18F81777-8F04-A44C-ABED-7D64A68B4B66}" type="datetimeFigureOut">
               <a:rPr lang="en-US" smtClean="0"/>
-              <a:t>10/24/15</a:t>
+              <a:t>4/4/16</a:t>
             </a:fld>
             <a:endParaRPr lang="en-US"/>
           </a:p>
@@ -1342,7 +1342,7 @@
           <a:p>
             <a:fld id="{18F81777-8F04-A44C-ABED-7D64A68B4B66}" type="datetimeFigureOut">
               <a:rPr lang="en-US" smtClean="0"/>
-              <a:t>10/24/15</a:t>
+              <a:t>4/4/16</a:t>
             </a:fld>
             <a:endParaRPr lang="en-US"/>
           </a:p>
@@ -1764,7 +1764,7 @@
           <a:p>
             <a:fld id="{18F81777-8F04-A44C-ABED-7D64A68B4B66}" type="datetimeFigureOut">
               <a:rPr lang="en-US" smtClean="0"/>
-              <a:t>10/24/15</a:t>
+              <a:t>4/4/16</a:t>
             </a:fld>
             <a:endParaRPr lang="en-US"/>
           </a:p>
@@ -1882,7 +1882,7 @@
           <a:p>
             <a:fld id="{18F81777-8F04-A44C-ABED-7D64A68B4B66}" type="datetimeFigureOut">
               <a:rPr lang="en-US" smtClean="0"/>
-              <a:t>10/24/15</a:t>
+              <a:t>4/4/16</a:t>
             </a:fld>
             <a:endParaRPr lang="en-US"/>
           </a:p>
@@ -1977,7 +1977,7 @@
           <a:p>
             <a:fld id="{18F81777-8F04-A44C-ABED-7D64A68B4B66}" type="datetimeFigureOut">
               <a:rPr lang="en-US" smtClean="0"/>
-              <a:t>10/24/15</a:t>
+              <a:t>4/4/16</a:t>
             </a:fld>
             <a:endParaRPr lang="en-US"/>
           </a:p>
@@ -2254,7 +2254,7 @@
           <a:p>
             <a:fld id="{18F81777-8F04-A44C-ABED-7D64A68B4B66}" type="datetimeFigureOut">
               <a:rPr lang="en-US" smtClean="0"/>
-              <a:t>10/24/15</a:t>
+              <a:t>4/4/16</a:t>
             </a:fld>
             <a:endParaRPr lang="en-US"/>
           </a:p>
@@ -2507,7 +2507,7 @@
           <a:p>
             <a:fld id="{18F81777-8F04-A44C-ABED-7D64A68B4B66}" type="datetimeFigureOut">
               <a:rPr lang="en-US" smtClean="0"/>
-              <a:t>10/24/15</a:t>
+              <a:t>4/4/16</a:t>
             </a:fld>
             <a:endParaRPr lang="en-US"/>
           </a:p>
@@ -2720,7 +2720,7 @@
           <a:p>
             <a:fld id="{18F81777-8F04-A44C-ABED-7D64A68B4B66}" type="datetimeFigureOut">
               <a:rPr lang="en-US" smtClean="0"/>
-              <a:t>10/24/15</a:t>
+              <a:t>4/4/16</a:t>
             </a:fld>
             <a:endParaRPr lang="en-US"/>
           </a:p>
@@ -3103,8 +3103,8 @@
         </p:nvSpPr>
         <p:spPr>
           <a:xfrm>
-            <a:off x="236577" y="1419541"/>
-            <a:ext cx="734634" cy="348659"/>
+            <a:off x="140392" y="1419541"/>
+            <a:ext cx="917976" cy="348659"/>
           </a:xfrm>
           <a:prstGeom prst="roundRect">
             <a:avLst/>
@@ -3130,23 +3130,23 @@
           <a:p>
             <a:pPr algn="ctr"/>
             <a:r>
-              <a:rPr lang="en-US" sz="1200" dirty="0" smtClean="0"/>
+              <a:rPr lang="en-US" sz="2000" dirty="0" smtClean="0"/>
               <a:t>Sensor</a:t>
             </a:r>
-            <a:endParaRPr lang="en-US" sz="1200" dirty="0"/>
-          </a:p>
-        </p:txBody>
-      </p:sp>
-      <p:sp>
-        <p:nvSpPr>
-          <p:cNvPr id="7" name="Rounded Rectangle 6"/>
+            <a:endParaRPr lang="en-US" sz="2000" dirty="0"/>
+          </a:p>
+        </p:txBody>
+      </p:sp>
+      <p:sp>
+        <p:nvSpPr>
+          <p:cNvPr id="12" name="Rounded Rectangle 11"/>
           <p:cNvSpPr/>
           <p:nvPr/>
         </p:nvSpPr>
         <p:spPr>
           <a:xfrm>
-            <a:off x="236577" y="1858340"/>
-            <a:ext cx="734634" cy="348659"/>
+            <a:off x="1708807" y="1677508"/>
+            <a:ext cx="1253163" cy="716802"/>
           </a:xfrm>
           <a:prstGeom prst="roundRect">
             <a:avLst/>
@@ -3172,91 +3172,7 @@
           <a:p>
             <a:pPr algn="ctr"/>
             <a:r>
-              <a:rPr lang="en-US" sz="1200" dirty="0" smtClean="0"/>
-              <a:t>Sensor</a:t>
-            </a:r>
-            <a:endParaRPr lang="en-US" sz="1200" dirty="0"/>
-          </a:p>
-        </p:txBody>
-      </p:sp>
-      <p:sp>
-        <p:nvSpPr>
-          <p:cNvPr id="8" name="Rounded Rectangle 7"/>
-          <p:cNvSpPr/>
-          <p:nvPr/>
-        </p:nvSpPr>
-        <p:spPr>
-          <a:xfrm>
-            <a:off x="236577" y="2306617"/>
-            <a:ext cx="734634" cy="348659"/>
-          </a:xfrm>
-          <a:prstGeom prst="roundRect">
-            <a:avLst/>
-          </a:prstGeom>
-        </p:spPr>
-        <p:style>
-          <a:lnRef idx="2">
-            <a:schemeClr val="dk1"/>
-          </a:lnRef>
-          <a:fillRef idx="1">
-            <a:schemeClr val="lt1"/>
-          </a:fillRef>
-          <a:effectRef idx="0">
-            <a:schemeClr val="dk1"/>
-          </a:effectRef>
-          <a:fontRef idx="minor">
-            <a:schemeClr val="dk1"/>
-          </a:fontRef>
-        </p:style>
-        <p:txBody>
-          <a:bodyPr rtlCol="0" anchor="ctr"/>
-          <a:lstStyle/>
-          <a:p>
-            <a:pPr algn="ctr"/>
-            <a:r>
-              <a:rPr lang="en-US" sz="1200" dirty="0" smtClean="0"/>
-              <a:t>Sensor</a:t>
-            </a:r>
-            <a:endParaRPr lang="en-US" sz="1200" dirty="0"/>
-          </a:p>
-        </p:txBody>
-      </p:sp>
-      <p:sp>
-        <p:nvSpPr>
-          <p:cNvPr id="12" name="Rounded Rectangle 11"/>
-          <p:cNvSpPr/>
-          <p:nvPr/>
-        </p:nvSpPr>
-        <p:spPr>
-          <a:xfrm>
-            <a:off x="1347729" y="1752220"/>
-            <a:ext cx="1130094" cy="557371"/>
-          </a:xfrm>
-          <a:prstGeom prst="roundRect">
-            <a:avLst/>
-          </a:prstGeom>
-        </p:spPr>
-        <p:style>
-          <a:lnRef idx="2">
-            <a:schemeClr val="dk1"/>
-          </a:lnRef>
-          <a:fillRef idx="1">
-            <a:schemeClr val="lt1"/>
-          </a:fillRef>
-          <a:effectRef idx="0">
-            <a:schemeClr val="dk1"/>
-          </a:effectRef>
-          <a:fontRef idx="minor">
-            <a:schemeClr val="dk1"/>
-          </a:fontRef>
-        </p:style>
-        <p:txBody>
-          <a:bodyPr rtlCol="0" anchor="ctr"/>
-          <a:lstStyle/>
-          <a:p>
-            <a:pPr algn="ctr"/>
-            <a:r>
-              <a:rPr lang="en-US" sz="1200" dirty="0" smtClean="0"/>
+              <a:rPr lang="en-US" sz="2000" dirty="0" smtClean="0"/>
               <a:t>Compute device</a:t>
             </a:r>
           </a:p>
@@ -3273,8 +3189,8 @@
         </p:nvCxnSpPr>
         <p:spPr>
           <a:xfrm>
-            <a:off x="971211" y="1593871"/>
-            <a:ext cx="376518" cy="437035"/>
+            <a:off x="1058368" y="1593871"/>
+            <a:ext cx="650439" cy="442038"/>
           </a:xfrm>
           <a:prstGeom prst="bentConnector3">
             <a:avLst/>
@@ -3302,15 +3218,15 @@
         <p:nvCxnSpPr>
           <p:cNvPr id="26" name="Elbow Connector 25"/>
           <p:cNvCxnSpPr>
-            <a:stCxn id="7" idx="3"/>
+            <a:stCxn id="29" idx="3"/>
             <a:endCxn id="12" idx="1"/>
           </p:cNvCxnSpPr>
           <p:nvPr/>
         </p:nvCxnSpPr>
         <p:spPr>
-          <a:xfrm flipV="1">
-            <a:off x="971211" y="2030906"/>
-            <a:ext cx="376518" cy="1764"/>
+          <a:xfrm>
+            <a:off x="1058368" y="2030905"/>
+            <a:ext cx="650439" cy="5004"/>
           </a:xfrm>
           <a:prstGeom prst="bentConnector3">
             <a:avLst/>
@@ -3338,18 +3254,20 @@
         <p:nvCxnSpPr>
           <p:cNvPr id="28" name="Elbow Connector 27"/>
           <p:cNvCxnSpPr>
-            <a:stCxn id="8" idx="3"/>
+            <a:stCxn id="37" idx="3"/>
             <a:endCxn id="12" idx="1"/>
           </p:cNvCxnSpPr>
           <p:nvPr/>
         </p:nvCxnSpPr>
         <p:spPr>
           <a:xfrm flipV="1">
-            <a:off x="971211" y="2030906"/>
-            <a:ext cx="376518" cy="450041"/>
+            <a:off x="1058368" y="2035909"/>
+            <a:ext cx="650439" cy="433113"/>
           </a:xfrm>
           <a:prstGeom prst="bentConnector3">
-            <a:avLst/>
+            <a:avLst>
+              <a:gd name="adj1" fmla="val 50000"/>
+            </a:avLst>
           </a:prstGeom>
           <a:ln>
             <a:tailEnd type="arrow"/>
@@ -3372,14 +3290,14 @@
       </p:cxnSp>
       <p:sp>
         <p:nvSpPr>
-          <p:cNvPr id="30" name="Rounded Rectangle 29"/>
+          <p:cNvPr id="33" name="Rounded Rectangle 32"/>
           <p:cNvSpPr/>
           <p:nvPr/>
         </p:nvSpPr>
         <p:spPr>
           <a:xfrm>
-            <a:off x="236577" y="3041291"/>
-            <a:ext cx="734634" cy="348659"/>
+            <a:off x="1733710" y="3299258"/>
+            <a:ext cx="1253162" cy="731701"/>
           </a:xfrm>
           <a:prstGeom prst="roundRect">
             <a:avLst/>
@@ -3405,133 +3323,7 @@
           <a:p>
             <a:pPr algn="ctr"/>
             <a:r>
-              <a:rPr lang="en-US" sz="1200" dirty="0" smtClean="0"/>
-              <a:t>Sensor</a:t>
-            </a:r>
-            <a:endParaRPr lang="en-US" sz="1200" dirty="0"/>
-          </a:p>
-        </p:txBody>
-      </p:sp>
-      <p:sp>
-        <p:nvSpPr>
-          <p:cNvPr id="31" name="Rounded Rectangle 30"/>
-          <p:cNvSpPr/>
-          <p:nvPr/>
-        </p:nvSpPr>
-        <p:spPr>
-          <a:xfrm>
-            <a:off x="236577" y="3480090"/>
-            <a:ext cx="734634" cy="348659"/>
-          </a:xfrm>
-          <a:prstGeom prst="roundRect">
-            <a:avLst/>
-          </a:prstGeom>
-        </p:spPr>
-        <p:style>
-          <a:lnRef idx="2">
-            <a:schemeClr val="dk1"/>
-          </a:lnRef>
-          <a:fillRef idx="1">
-            <a:schemeClr val="lt1"/>
-          </a:fillRef>
-          <a:effectRef idx="0">
-            <a:schemeClr val="dk1"/>
-          </a:effectRef>
-          <a:fontRef idx="minor">
-            <a:schemeClr val="dk1"/>
-          </a:fontRef>
-        </p:style>
-        <p:txBody>
-          <a:bodyPr rtlCol="0" anchor="ctr"/>
-          <a:lstStyle/>
-          <a:p>
-            <a:pPr algn="ctr"/>
-            <a:r>
-              <a:rPr lang="en-US" sz="1200" dirty="0" smtClean="0"/>
-              <a:t>Sensor</a:t>
-            </a:r>
-            <a:endParaRPr lang="en-US" sz="1200" dirty="0"/>
-          </a:p>
-        </p:txBody>
-      </p:sp>
-      <p:sp>
-        <p:nvSpPr>
-          <p:cNvPr id="32" name="Rounded Rectangle 31"/>
-          <p:cNvSpPr/>
-          <p:nvPr/>
-        </p:nvSpPr>
-        <p:spPr>
-          <a:xfrm>
-            <a:off x="236577" y="3928367"/>
-            <a:ext cx="734634" cy="348659"/>
-          </a:xfrm>
-          <a:prstGeom prst="roundRect">
-            <a:avLst/>
-          </a:prstGeom>
-        </p:spPr>
-        <p:style>
-          <a:lnRef idx="2">
-            <a:schemeClr val="dk1"/>
-          </a:lnRef>
-          <a:fillRef idx="1">
-            <a:schemeClr val="lt1"/>
-          </a:fillRef>
-          <a:effectRef idx="0">
-            <a:schemeClr val="dk1"/>
-          </a:effectRef>
-          <a:fontRef idx="minor">
-            <a:schemeClr val="dk1"/>
-          </a:fontRef>
-        </p:style>
-        <p:txBody>
-          <a:bodyPr rtlCol="0" anchor="ctr"/>
-          <a:lstStyle/>
-          <a:p>
-            <a:pPr algn="ctr"/>
-            <a:r>
-              <a:rPr lang="en-US" sz="1200" dirty="0" smtClean="0"/>
-              <a:t>Sensor</a:t>
-            </a:r>
-            <a:endParaRPr lang="en-US" sz="1200" dirty="0"/>
-          </a:p>
-        </p:txBody>
-      </p:sp>
-      <p:sp>
-        <p:nvSpPr>
-          <p:cNvPr id="33" name="Rounded Rectangle 32"/>
-          <p:cNvSpPr/>
-          <p:nvPr/>
-        </p:nvSpPr>
-        <p:spPr>
-          <a:xfrm>
-            <a:off x="1347729" y="3373970"/>
-            <a:ext cx="1130094" cy="557371"/>
-          </a:xfrm>
-          <a:prstGeom prst="roundRect">
-            <a:avLst/>
-          </a:prstGeom>
-        </p:spPr>
-        <p:style>
-          <a:lnRef idx="2">
-            <a:schemeClr val="dk1"/>
-          </a:lnRef>
-          <a:fillRef idx="1">
-            <a:schemeClr val="lt1"/>
-          </a:fillRef>
-          <a:effectRef idx="0">
-            <a:schemeClr val="dk1"/>
-          </a:effectRef>
-          <a:fontRef idx="minor">
-            <a:schemeClr val="dk1"/>
-          </a:fontRef>
-        </p:style>
-        <p:txBody>
-          <a:bodyPr rtlCol="0" anchor="ctr"/>
-          <a:lstStyle/>
-          <a:p>
-            <a:pPr algn="ctr"/>
-            <a:r>
-              <a:rPr lang="en-US" sz="1200" dirty="0" smtClean="0"/>
+              <a:rPr lang="en-US" sz="2000" dirty="0" smtClean="0"/>
               <a:t>Compute device</a:t>
             </a:r>
           </a:p>
@@ -3541,18 +3333,20 @@
         <p:nvCxnSpPr>
           <p:cNvPr id="34" name="Elbow Connector 33"/>
           <p:cNvCxnSpPr>
-            <a:stCxn id="30" idx="3"/>
+            <a:stCxn id="39" idx="3"/>
             <a:endCxn id="33" idx="1"/>
           </p:cNvCxnSpPr>
           <p:nvPr/>
         </p:nvCxnSpPr>
         <p:spPr>
           <a:xfrm>
-            <a:off x="971211" y="3215621"/>
-            <a:ext cx="376518" cy="437035"/>
+            <a:off x="1058368" y="3230520"/>
+            <a:ext cx="675342" cy="434589"/>
           </a:xfrm>
           <a:prstGeom prst="bentConnector3">
-            <a:avLst/>
+            <a:avLst>
+              <a:gd name="adj1" fmla="val 50000"/>
+            </a:avLst>
           </a:prstGeom>
           <a:ln>
             <a:tailEnd type="arrow"/>
@@ -3577,18 +3371,20 @@
         <p:nvCxnSpPr>
           <p:cNvPr id="35" name="Elbow Connector 34"/>
           <p:cNvCxnSpPr>
-            <a:stCxn id="31" idx="3"/>
+            <a:stCxn id="41" idx="3"/>
             <a:endCxn id="33" idx="1"/>
           </p:cNvCxnSpPr>
           <p:nvPr/>
         </p:nvCxnSpPr>
         <p:spPr>
           <a:xfrm flipV="1">
-            <a:off x="971211" y="3652656"/>
-            <a:ext cx="376518" cy="1764"/>
+            <a:off x="1058368" y="3665109"/>
+            <a:ext cx="675342" cy="2445"/>
           </a:xfrm>
           <a:prstGeom prst="bentConnector3">
-            <a:avLst/>
+            <a:avLst>
+              <a:gd name="adj1" fmla="val 50000"/>
+            </a:avLst>
           </a:prstGeom>
           <a:ln>
             <a:tailEnd type="arrow"/>
@@ -3613,18 +3409,20 @@
         <p:nvCxnSpPr>
           <p:cNvPr id="36" name="Elbow Connector 35"/>
           <p:cNvCxnSpPr>
-            <a:stCxn id="32" idx="3"/>
+            <a:stCxn id="42" idx="3"/>
             <a:endCxn id="33" idx="1"/>
           </p:cNvCxnSpPr>
           <p:nvPr/>
         </p:nvCxnSpPr>
         <p:spPr>
           <a:xfrm flipV="1">
-            <a:off x="971211" y="3652656"/>
-            <a:ext cx="376518" cy="450041"/>
+            <a:off x="1058368" y="3665109"/>
+            <a:ext cx="675342" cy="440562"/>
           </a:xfrm>
           <a:prstGeom prst="bentConnector3">
-            <a:avLst/>
+            <a:avLst>
+              <a:gd name="adj1" fmla="val 50000"/>
+            </a:avLst>
           </a:prstGeom>
           <a:ln>
             <a:tailEnd type="arrow"/>
@@ -3655,9 +3453,9 @@
           <p:nvPr/>
         </p:nvCxnSpPr>
         <p:spPr>
-          <a:xfrm rot="10800000">
-            <a:off x="2477824" y="2030906"/>
-            <a:ext cx="943679" cy="12700"/>
+          <a:xfrm rot="10800000" flipV="1">
+            <a:off x="2961970" y="2030905"/>
+            <a:ext cx="459532" cy="5003"/>
           </a:xfrm>
           <a:prstGeom prst="bentConnector3">
             <a:avLst/>
@@ -3692,8 +3490,8 @@
         </p:nvCxnSpPr>
         <p:spPr>
           <a:xfrm flipV="1">
-            <a:off x="2477823" y="2030906"/>
-            <a:ext cx="943679" cy="1621750"/>
+            <a:off x="2986872" y="2030906"/>
+            <a:ext cx="434630" cy="1634203"/>
           </a:xfrm>
           <a:prstGeom prst="bentConnector3">
             <a:avLst/>
@@ -3753,10 +3551,10 @@
           <a:p>
             <a:pPr algn="ctr"/>
             <a:r>
-              <a:rPr lang="en-US" dirty="0" smtClean="0"/>
+              <a:rPr lang="en-US" sz="2000" dirty="0" smtClean="0"/>
               <a:t>Cloud Computing Data Center</a:t>
             </a:r>
-            <a:endParaRPr lang="en-US" dirty="0"/>
+            <a:endParaRPr lang="en-US" sz="2000" dirty="0"/>
           </a:p>
         </p:txBody>
       </p:sp>
@@ -3854,7 +3652,7 @@
         <p:spPr>
           <a:xfrm>
             <a:off x="5873766" y="5611898"/>
-            <a:ext cx="2132487" cy="369332"/>
+            <a:ext cx="2132487" cy="707886"/>
           </a:xfrm>
           <a:prstGeom prst="rect">
             <a:avLst/>
@@ -3869,10 +3667,10 @@
           <a:p>
             <a:pPr algn="ctr"/>
             <a:r>
-              <a:rPr lang="en-US" dirty="0" smtClean="0"/>
+              <a:rPr lang="en-US" sz="2000" dirty="0" smtClean="0"/>
               <a:t>Presentation devices</a:t>
             </a:r>
-            <a:endParaRPr lang="en-US" dirty="0"/>
+            <a:endParaRPr lang="en-US" sz="2000" dirty="0"/>
           </a:p>
         </p:txBody>
       </p:sp>
@@ -3974,6 +3772,216 @@
           </a:fontRef>
         </p:style>
       </p:cxnSp>
+      <p:sp>
+        <p:nvSpPr>
+          <p:cNvPr id="29" name="Rounded Rectangle 28"/>
+          <p:cNvSpPr/>
+          <p:nvPr/>
+        </p:nvSpPr>
+        <p:spPr>
+          <a:xfrm>
+            <a:off x="140392" y="1856575"/>
+            <a:ext cx="917976" cy="348659"/>
+          </a:xfrm>
+          <a:prstGeom prst="roundRect">
+            <a:avLst/>
+          </a:prstGeom>
+        </p:spPr>
+        <p:style>
+          <a:lnRef idx="2">
+            <a:schemeClr val="dk1"/>
+          </a:lnRef>
+          <a:fillRef idx="1">
+            <a:schemeClr val="lt1"/>
+          </a:fillRef>
+          <a:effectRef idx="0">
+            <a:schemeClr val="dk1"/>
+          </a:effectRef>
+          <a:fontRef idx="minor">
+            <a:schemeClr val="dk1"/>
+          </a:fontRef>
+        </p:style>
+        <p:txBody>
+          <a:bodyPr rtlCol="0" anchor="ctr"/>
+          <a:lstStyle/>
+          <a:p>
+            <a:pPr algn="ctr"/>
+            <a:r>
+              <a:rPr lang="en-US" sz="2000" dirty="0" smtClean="0"/>
+              <a:t>Sensor</a:t>
+            </a:r>
+            <a:endParaRPr lang="en-US" sz="2000" dirty="0"/>
+          </a:p>
+        </p:txBody>
+      </p:sp>
+      <p:sp>
+        <p:nvSpPr>
+          <p:cNvPr id="37" name="Rounded Rectangle 36"/>
+          <p:cNvSpPr/>
+          <p:nvPr/>
+        </p:nvSpPr>
+        <p:spPr>
+          <a:xfrm>
+            <a:off x="140392" y="2294692"/>
+            <a:ext cx="917976" cy="348659"/>
+          </a:xfrm>
+          <a:prstGeom prst="roundRect">
+            <a:avLst/>
+          </a:prstGeom>
+        </p:spPr>
+        <p:style>
+          <a:lnRef idx="2">
+            <a:schemeClr val="dk1"/>
+          </a:lnRef>
+          <a:fillRef idx="1">
+            <a:schemeClr val="lt1"/>
+          </a:fillRef>
+          <a:effectRef idx="0">
+            <a:schemeClr val="dk1"/>
+          </a:effectRef>
+          <a:fontRef idx="minor">
+            <a:schemeClr val="dk1"/>
+          </a:fontRef>
+        </p:style>
+        <p:txBody>
+          <a:bodyPr rtlCol="0" anchor="ctr"/>
+          <a:lstStyle/>
+          <a:p>
+            <a:pPr algn="ctr"/>
+            <a:r>
+              <a:rPr lang="en-US" sz="2000" dirty="0" smtClean="0"/>
+              <a:t>Sensor</a:t>
+            </a:r>
+            <a:endParaRPr lang="en-US" sz="2000" dirty="0"/>
+          </a:p>
+        </p:txBody>
+      </p:sp>
+      <p:sp>
+        <p:nvSpPr>
+          <p:cNvPr id="39" name="Rounded Rectangle 38"/>
+          <p:cNvSpPr/>
+          <p:nvPr/>
+        </p:nvSpPr>
+        <p:spPr>
+          <a:xfrm>
+            <a:off x="140392" y="3056190"/>
+            <a:ext cx="917976" cy="348659"/>
+          </a:xfrm>
+          <a:prstGeom prst="roundRect">
+            <a:avLst/>
+          </a:prstGeom>
+        </p:spPr>
+        <p:style>
+          <a:lnRef idx="2">
+            <a:schemeClr val="dk1"/>
+          </a:lnRef>
+          <a:fillRef idx="1">
+            <a:schemeClr val="lt1"/>
+          </a:fillRef>
+          <a:effectRef idx="0">
+            <a:schemeClr val="dk1"/>
+          </a:effectRef>
+          <a:fontRef idx="minor">
+            <a:schemeClr val="dk1"/>
+          </a:fontRef>
+        </p:style>
+        <p:txBody>
+          <a:bodyPr rtlCol="0" anchor="ctr"/>
+          <a:lstStyle/>
+          <a:p>
+            <a:pPr algn="ctr"/>
+            <a:r>
+              <a:rPr lang="en-US" sz="2000" dirty="0" smtClean="0"/>
+              <a:t>Sensor</a:t>
+            </a:r>
+            <a:endParaRPr lang="en-US" sz="2000" dirty="0"/>
+          </a:p>
+        </p:txBody>
+      </p:sp>
+      <p:sp>
+        <p:nvSpPr>
+          <p:cNvPr id="41" name="Rounded Rectangle 40"/>
+          <p:cNvSpPr/>
+          <p:nvPr/>
+        </p:nvSpPr>
+        <p:spPr>
+          <a:xfrm>
+            <a:off x="140392" y="3493224"/>
+            <a:ext cx="917976" cy="348659"/>
+          </a:xfrm>
+          <a:prstGeom prst="roundRect">
+            <a:avLst/>
+          </a:prstGeom>
+        </p:spPr>
+        <p:style>
+          <a:lnRef idx="2">
+            <a:schemeClr val="dk1"/>
+          </a:lnRef>
+          <a:fillRef idx="1">
+            <a:schemeClr val="lt1"/>
+          </a:fillRef>
+          <a:effectRef idx="0">
+            <a:schemeClr val="dk1"/>
+          </a:effectRef>
+          <a:fontRef idx="minor">
+            <a:schemeClr val="dk1"/>
+          </a:fontRef>
+        </p:style>
+        <p:txBody>
+          <a:bodyPr rtlCol="0" anchor="ctr"/>
+          <a:lstStyle/>
+          <a:p>
+            <a:pPr algn="ctr"/>
+            <a:r>
+              <a:rPr lang="en-US" sz="2000" dirty="0" smtClean="0"/>
+              <a:t>Sensor</a:t>
+            </a:r>
+            <a:endParaRPr lang="en-US" sz="2000" dirty="0"/>
+          </a:p>
+        </p:txBody>
+      </p:sp>
+      <p:sp>
+        <p:nvSpPr>
+          <p:cNvPr id="42" name="Rounded Rectangle 41"/>
+          <p:cNvSpPr/>
+          <p:nvPr/>
+        </p:nvSpPr>
+        <p:spPr>
+          <a:xfrm>
+            <a:off x="140392" y="3931341"/>
+            <a:ext cx="917976" cy="348659"/>
+          </a:xfrm>
+          <a:prstGeom prst="roundRect">
+            <a:avLst/>
+          </a:prstGeom>
+        </p:spPr>
+        <p:style>
+          <a:lnRef idx="2">
+            <a:schemeClr val="dk1"/>
+          </a:lnRef>
+          <a:fillRef idx="1">
+            <a:schemeClr val="lt1"/>
+          </a:fillRef>
+          <a:effectRef idx="0">
+            <a:schemeClr val="dk1"/>
+          </a:effectRef>
+          <a:fontRef idx="minor">
+            <a:schemeClr val="dk1"/>
+          </a:fontRef>
+        </p:style>
+        <p:txBody>
+          <a:bodyPr rtlCol="0" anchor="ctr"/>
+          <a:lstStyle/>
+          <a:p>
+            <a:pPr algn="ctr"/>
+            <a:r>
+              <a:rPr lang="en-US" sz="2000" dirty="0" smtClean="0"/>
+              <a:t>Sensor</a:t>
+            </a:r>
+            <a:endParaRPr lang="en-US" sz="2000" dirty="0"/>
+          </a:p>
+        </p:txBody>
+      </p:sp>
     </p:spTree>
     <p:extLst>
       <p:ext uri="{BB962C8B-B14F-4D97-AF65-F5344CB8AC3E}">

</xml_diff>